<commit_message>
Update PowerPoint processing with new features and fixes
- Changed template file path from `template_2.pptx` to `template_3.pptx`.
- Adjusted item generation loop to iterate from 1 to 3.
- Added `ImageUrl` property to the `Item` class.
- Introduced new file `template_3.pptx` and noted binary differences in existing templates.
- Made minor text updates in `AI_RULE.md`.
- Added global using directive for `DocuChef.Helpers` in `GlobalUsings.cs`.
- Created `CollectionHelper` class for counting items in collections.
- Enhanced error handling for out-of-range array references across various classes.
- Updated `PowerPointProcessor.cs` to manage shape visibility based on data availability.
- Added `ShapeVisibilityManager` and `OutOfRangeShapeHandler` classes for better shape management.
- Improved text processing logic in `TextProcessingHelper.cs` to support new patterns.
- Updated slide processing logic in `PowerPointProcessor.Slides.cs` for array references and duplication handling.
</commit_message>
<xml_diff>
--- a/src/DocuChef.TestConsoleApp/files/ppt/template_2.pptx
+++ b/src/DocuChef.TestConsoleApp/files/ppt/template_2.pptx
@@ -4029,7 +4029,7 @@
             <a:pPr algn="ctr"/>
             <a:r>
               <a:rPr lang="en-US" altLang="ko-KR" sz="1100"/>
-              <a:t>${ppt.Image("LogoPath")}</a:t>
+              <a:t>${ppt.Image(LogoPath)}</a:t>
             </a:r>
             <a:endParaRPr lang="ko-KR" altLang="en-US" sz="1100"/>
           </a:p>
@@ -4184,8 +4184,8 @@
         </p:nvSpPr>
         <p:spPr>
           <a:xfrm>
-            <a:off x="330595" y="217323"/>
-            <a:ext cx="1213449" cy="954657"/>
+            <a:off x="330595" y="217324"/>
+            <a:ext cx="1093471" cy="951910"/>
           </a:xfrm>
           <a:prstGeom prst="rect">
             <a:avLst/>
@@ -4214,7 +4214,7 @@
             <a:pPr algn="ctr"/>
             <a:r>
               <a:rPr lang="en-US" altLang="ko-KR" sz="1200"/>
-              <a:t>${ppt.Image("LogoPath")}</a:t>
+              <a:t>${ppt.Image(LogoPath)}</a:t>
             </a:r>
             <a:endParaRPr lang="ko-KR" altLang="en-US" sz="1200"/>
           </a:p>

</xml_diff>